<commit_message>
start writing the lower model solution analysis
</commit_message>
<xml_diff>
--- a/图.pptx
+++ b/图.pptx
@@ -260,7 +260,7 @@
           <a:p>
             <a:fld id="{8E376B85-EF16-4228-B7F0-184D2105F050}" type="datetimeFigureOut">
               <a:rPr lang="zh-CN" altLang="en-US" smtClean="0"/>
-              <a:t>2025/4/3</a:t>
+              <a:t>2025/4/4</a:t>
             </a:fld>
             <a:endParaRPr lang="zh-CN" altLang="en-US"/>
           </a:p>
@@ -458,7 +458,7 @@
           <a:p>
             <a:fld id="{8E376B85-EF16-4228-B7F0-184D2105F050}" type="datetimeFigureOut">
               <a:rPr lang="zh-CN" altLang="en-US" smtClean="0"/>
-              <a:t>2025/4/3</a:t>
+              <a:t>2025/4/4</a:t>
             </a:fld>
             <a:endParaRPr lang="zh-CN" altLang="en-US"/>
           </a:p>
@@ -666,7 +666,7 @@
           <a:p>
             <a:fld id="{8E376B85-EF16-4228-B7F0-184D2105F050}" type="datetimeFigureOut">
               <a:rPr lang="zh-CN" altLang="en-US" smtClean="0"/>
-              <a:t>2025/4/3</a:t>
+              <a:t>2025/4/4</a:t>
             </a:fld>
             <a:endParaRPr lang="zh-CN" altLang="en-US"/>
           </a:p>
@@ -864,7 +864,7 @@
           <a:p>
             <a:fld id="{8E376B85-EF16-4228-B7F0-184D2105F050}" type="datetimeFigureOut">
               <a:rPr lang="zh-CN" altLang="en-US" smtClean="0"/>
-              <a:t>2025/4/3</a:t>
+              <a:t>2025/4/4</a:t>
             </a:fld>
             <a:endParaRPr lang="zh-CN" altLang="en-US"/>
           </a:p>
@@ -1139,7 +1139,7 @@
           <a:p>
             <a:fld id="{8E376B85-EF16-4228-B7F0-184D2105F050}" type="datetimeFigureOut">
               <a:rPr lang="zh-CN" altLang="en-US" smtClean="0"/>
-              <a:t>2025/4/3</a:t>
+              <a:t>2025/4/4</a:t>
             </a:fld>
             <a:endParaRPr lang="zh-CN" altLang="en-US"/>
           </a:p>
@@ -1404,7 +1404,7 @@
           <a:p>
             <a:fld id="{8E376B85-EF16-4228-B7F0-184D2105F050}" type="datetimeFigureOut">
               <a:rPr lang="zh-CN" altLang="en-US" smtClean="0"/>
-              <a:t>2025/4/3</a:t>
+              <a:t>2025/4/4</a:t>
             </a:fld>
             <a:endParaRPr lang="zh-CN" altLang="en-US"/>
           </a:p>
@@ -1816,7 +1816,7 @@
           <a:p>
             <a:fld id="{8E376B85-EF16-4228-B7F0-184D2105F050}" type="datetimeFigureOut">
               <a:rPr lang="zh-CN" altLang="en-US" smtClean="0"/>
-              <a:t>2025/4/3</a:t>
+              <a:t>2025/4/4</a:t>
             </a:fld>
             <a:endParaRPr lang="zh-CN" altLang="en-US"/>
           </a:p>
@@ -1957,7 +1957,7 @@
           <a:p>
             <a:fld id="{8E376B85-EF16-4228-B7F0-184D2105F050}" type="datetimeFigureOut">
               <a:rPr lang="zh-CN" altLang="en-US" smtClean="0"/>
-              <a:t>2025/4/3</a:t>
+              <a:t>2025/4/4</a:t>
             </a:fld>
             <a:endParaRPr lang="zh-CN" altLang="en-US"/>
           </a:p>
@@ -2070,7 +2070,7 @@
           <a:p>
             <a:fld id="{8E376B85-EF16-4228-B7F0-184D2105F050}" type="datetimeFigureOut">
               <a:rPr lang="zh-CN" altLang="en-US" smtClean="0"/>
-              <a:t>2025/4/3</a:t>
+              <a:t>2025/4/4</a:t>
             </a:fld>
             <a:endParaRPr lang="zh-CN" altLang="en-US"/>
           </a:p>
@@ -2381,7 +2381,7 @@
           <a:p>
             <a:fld id="{8E376B85-EF16-4228-B7F0-184D2105F050}" type="datetimeFigureOut">
               <a:rPr lang="zh-CN" altLang="en-US" smtClean="0"/>
-              <a:t>2025/4/3</a:t>
+              <a:t>2025/4/4</a:t>
             </a:fld>
             <a:endParaRPr lang="zh-CN" altLang="en-US"/>
           </a:p>
@@ -2669,7 +2669,7 @@
           <a:p>
             <a:fld id="{8E376B85-EF16-4228-B7F0-184D2105F050}" type="datetimeFigureOut">
               <a:rPr lang="zh-CN" altLang="en-US" smtClean="0"/>
-              <a:t>2025/4/3</a:t>
+              <a:t>2025/4/4</a:t>
             </a:fld>
             <a:endParaRPr lang="zh-CN" altLang="en-US"/>
           </a:p>
@@ -2910,7 +2910,7 @@
           <a:p>
             <a:fld id="{8E376B85-EF16-4228-B7F0-184D2105F050}" type="datetimeFigureOut">
               <a:rPr lang="zh-CN" altLang="en-US" smtClean="0"/>
-              <a:t>2025/4/3</a:t>
+              <a:t>2025/4/4</a:t>
             </a:fld>
             <a:endParaRPr lang="zh-CN" altLang="en-US"/>
           </a:p>
@@ -7144,6 +7144,42 @@
           </a:fontRef>
         </p:style>
       </p:cxnSp>
+      <p:pic>
+        <p:nvPicPr>
+          <p:cNvPr id="67" name="图片 66">
+            <a:extLst>
+              <a:ext uri="{FF2B5EF4-FFF2-40B4-BE49-F238E27FC236}">
+                <a16:creationId xmlns:a16="http://schemas.microsoft.com/office/drawing/2014/main" id="{0EDA9BA8-CA9A-42D4-9B6A-E2326B75B89D}"/>
+              </a:ext>
+            </a:extLst>
+          </p:cNvPr>
+          <p:cNvPicPr>
+            <a:picLocks noChangeAspect="1"/>
+          </p:cNvPicPr>
+          <p:nvPr/>
+        </p:nvPicPr>
+        <p:blipFill>
+          <a:blip r:embed="rId2">
+            <a:extLst>
+              <a:ext uri="{28A0092B-C50C-407E-A947-70E740481C1C}">
+                <a14:useLocalDpi xmlns:a14="http://schemas.microsoft.com/office/drawing/2010/main" val="0"/>
+              </a:ext>
+            </a:extLst>
+          </a:blip>
+          <a:stretch>
+            <a:fillRect/>
+          </a:stretch>
+        </p:blipFill>
+        <p:spPr>
+          <a:xfrm>
+            <a:off x="10234261" y="295053"/>
+            <a:ext cx="1698659" cy="1178445"/>
+          </a:xfrm>
+          <a:prstGeom prst="rect">
+            <a:avLst/>
+          </a:prstGeom>
+        </p:spPr>
+      </p:pic>
     </p:spTree>
     <p:extLst>
       <p:ext uri="{BB962C8B-B14F-4D97-AF65-F5344CB8AC3E}">
@@ -7174,42 +7210,1507 @@
           <a:chExt cx="0" cy="0"/>
         </a:xfrm>
       </p:grpSpPr>
-      <p:pic>
-        <p:nvPicPr>
-          <p:cNvPr id="6" name="图片 5">
-            <a:extLst>
-              <a:ext uri="{FF2B5EF4-FFF2-40B4-BE49-F238E27FC236}">
-                <a16:creationId xmlns:a16="http://schemas.microsoft.com/office/drawing/2014/main" id="{9D32434D-DE3E-4073-9DDC-86904B01BA63}"/>
-              </a:ext>
-            </a:extLst>
-          </p:cNvPr>
-          <p:cNvPicPr>
-            <a:picLocks noChangeAspect="1"/>
-          </p:cNvPicPr>
+      <p:graphicFrame>
+        <p:nvGraphicFramePr>
+          <p:cNvPr id="48" name="表格 48">
+            <a:extLst>
+              <a:ext uri="{FF2B5EF4-FFF2-40B4-BE49-F238E27FC236}">
+                <a16:creationId xmlns:a16="http://schemas.microsoft.com/office/drawing/2014/main" id="{F6C96813-E874-4239-BF4C-7DD65643147B}"/>
+              </a:ext>
+            </a:extLst>
+          </p:cNvPr>
+          <p:cNvGraphicFramePr>
+            <a:graphicFrameLocks noGrp="1"/>
+          </p:cNvGraphicFramePr>
+          <p:nvPr>
+            <p:extLst>
+              <p:ext uri="{D42A27DB-BD31-4B8C-83A1-F6EECF244321}">
+                <p14:modId xmlns:p14="http://schemas.microsoft.com/office/powerpoint/2010/main" val="2633271960"/>
+              </p:ext>
+            </p:extLst>
+          </p:nvPr>
+        </p:nvGraphicFramePr>
+        <p:xfrm>
+          <a:off x="1934935" y="4021525"/>
+          <a:ext cx="6208123" cy="822960"/>
+        </p:xfrm>
+        <a:graphic>
+          <a:graphicData uri="http://schemas.openxmlformats.org/drawingml/2006/table">
+            <a:tbl>
+              <a:tblPr firstRow="1" bandRow="1">
+                <a:tableStyleId>{5C22544A-7EE6-4342-B048-85BDC9FD1C3A}</a:tableStyleId>
+              </a:tblPr>
+              <a:tblGrid>
+                <a:gridCol w="1126672">
+                  <a:extLst>
+                    <a:ext uri="{9D8B030D-6E8A-4147-A177-3AD203B41FA5}">
+                      <a16:colId xmlns:a16="http://schemas.microsoft.com/office/drawing/2014/main" val="303907"/>
+                    </a:ext>
+                  </a:extLst>
+                </a:gridCol>
+                <a:gridCol w="1149531">
+                  <a:extLst>
+                    <a:ext uri="{9D8B030D-6E8A-4147-A177-3AD203B41FA5}">
+                      <a16:colId xmlns:a16="http://schemas.microsoft.com/office/drawing/2014/main" val="1954991334"/>
+                    </a:ext>
+                  </a:extLst>
+                </a:gridCol>
+                <a:gridCol w="1169127">
+                  <a:extLst>
+                    <a:ext uri="{9D8B030D-6E8A-4147-A177-3AD203B41FA5}">
+                      <a16:colId xmlns:a16="http://schemas.microsoft.com/office/drawing/2014/main" val="2240533085"/>
+                    </a:ext>
+                  </a:extLst>
+                </a:gridCol>
+                <a:gridCol w="1495696">
+                  <a:extLst>
+                    <a:ext uri="{9D8B030D-6E8A-4147-A177-3AD203B41FA5}">
+                      <a16:colId xmlns:a16="http://schemas.microsoft.com/office/drawing/2014/main" val="3068611212"/>
+                    </a:ext>
+                  </a:extLst>
+                </a:gridCol>
+                <a:gridCol w="1267097">
+                  <a:extLst>
+                    <a:ext uri="{9D8B030D-6E8A-4147-A177-3AD203B41FA5}">
+                      <a16:colId xmlns:a16="http://schemas.microsoft.com/office/drawing/2014/main" val="923335274"/>
+                    </a:ext>
+                  </a:extLst>
+                </a:gridCol>
+              </a:tblGrid>
+              <a:tr h="206426">
+                <a:tc>
+                  <a:txBody>
+                    <a:bodyPr/>
+                    <a:lstStyle/>
+                    <a:p>
+                      <a:pPr algn="ctr"/>
+                      <a:r>
+                        <a:rPr lang="zh-CN" altLang="en-US" sz="1200" dirty="0">
+                          <a:latin typeface="楷体" panose="02010609060101010101" pitchFamily="49" charset="-122"/>
+                          <a:ea typeface="楷体" panose="02010609060101010101" pitchFamily="49" charset="-122"/>
+                        </a:rPr>
+                        <a:t>信息提供策略</a:t>
+                      </a:r>
+                    </a:p>
+                  </a:txBody>
+                  <a:tcPr/>
+                </a:tc>
+                <a:tc>
+                  <a:txBody>
+                    <a:bodyPr/>
+                    <a:lstStyle/>
+                    <a:p>
+                      <a:pPr algn="ctr"/>
+                      <a:r>
+                        <a:rPr lang="en-US" altLang="zh-CN" sz="1200" dirty="0">
+                          <a:latin typeface="楷体" panose="02010609060101010101" pitchFamily="49" charset="-122"/>
+                          <a:ea typeface="楷体" panose="02010609060101010101" pitchFamily="49" charset="-122"/>
+                        </a:rPr>
+                        <a:t>B-C</a:t>
+                      </a:r>
+                      <a:r>
+                        <a:rPr lang="zh-CN" altLang="en-US" sz="1200" dirty="0">
+                          <a:latin typeface="楷体" panose="02010609060101010101" pitchFamily="49" charset="-122"/>
+                          <a:ea typeface="楷体" panose="02010609060101010101" pitchFamily="49" charset="-122"/>
+                        </a:rPr>
+                        <a:t>出行者</a:t>
+                      </a:r>
+                      <a:r>
+                        <a:rPr lang="en-US" altLang="zh-CN" sz="1200" dirty="0">
+                          <a:latin typeface="楷体" panose="02010609060101010101" pitchFamily="49" charset="-122"/>
+                          <a:ea typeface="楷体" panose="02010609060101010101" pitchFamily="49" charset="-122"/>
+                        </a:rPr>
+                        <a:t>(U1)</a:t>
+                      </a:r>
+                      <a:endParaRPr lang="zh-CN" altLang="en-US" sz="1200" dirty="0">
+                        <a:latin typeface="楷体" panose="02010609060101010101" pitchFamily="49" charset="-122"/>
+                        <a:ea typeface="楷体" panose="02010609060101010101" pitchFamily="49" charset="-122"/>
+                      </a:endParaRPr>
+                    </a:p>
+                  </a:txBody>
+                  <a:tcPr/>
+                </a:tc>
+                <a:tc>
+                  <a:txBody>
+                    <a:bodyPr/>
+                    <a:lstStyle/>
+                    <a:p>
+                      <a:pPr algn="ctr"/>
+                      <a:r>
+                        <a:rPr lang="en-US" altLang="zh-CN" sz="1200" dirty="0">
+                          <a:latin typeface="楷体" panose="02010609060101010101" pitchFamily="49" charset="-122"/>
+                          <a:ea typeface="楷体" panose="02010609060101010101" pitchFamily="49" charset="-122"/>
+                        </a:rPr>
+                        <a:t>A-D</a:t>
+                      </a:r>
+                      <a:r>
+                        <a:rPr lang="zh-CN" altLang="en-US" sz="1200" dirty="0">
+                          <a:latin typeface="楷体" panose="02010609060101010101" pitchFamily="49" charset="-122"/>
+                          <a:ea typeface="楷体" panose="02010609060101010101" pitchFamily="49" charset="-122"/>
+                        </a:rPr>
+                        <a:t>出行者</a:t>
+                      </a:r>
+                      <a:r>
+                        <a:rPr lang="en-US" altLang="zh-CN" sz="1200" dirty="0">
+                          <a:latin typeface="楷体" panose="02010609060101010101" pitchFamily="49" charset="-122"/>
+                          <a:ea typeface="楷体" panose="02010609060101010101" pitchFamily="49" charset="-122"/>
+                        </a:rPr>
+                        <a:t>(U2)</a:t>
+                      </a:r>
+                      <a:endParaRPr lang="zh-CN" altLang="en-US" sz="1200" dirty="0">
+                        <a:latin typeface="楷体" panose="02010609060101010101" pitchFamily="49" charset="-122"/>
+                        <a:ea typeface="楷体" panose="02010609060101010101" pitchFamily="49" charset="-122"/>
+                      </a:endParaRPr>
+                    </a:p>
+                  </a:txBody>
+                  <a:tcPr/>
+                </a:tc>
+                <a:tc>
+                  <a:txBody>
+                    <a:bodyPr/>
+                    <a:lstStyle/>
+                    <a:p>
+                      <a:pPr algn="ctr"/>
+                      <a:r>
+                        <a:rPr lang="zh-CN" altLang="en-US" sz="1200" dirty="0">
+                          <a:latin typeface="楷体" panose="02010609060101010101" pitchFamily="49" charset="-122"/>
+                          <a:ea typeface="楷体" panose="02010609060101010101" pitchFamily="49" charset="-122"/>
+                        </a:rPr>
+                        <a:t>路径选择情况</a:t>
+                      </a:r>
+                    </a:p>
+                  </a:txBody>
+                  <a:tcPr/>
+                </a:tc>
+                <a:tc>
+                  <a:txBody>
+                    <a:bodyPr/>
+                    <a:lstStyle/>
+                    <a:p>
+                      <a:pPr algn="ctr"/>
+                      <a:r>
+                        <a:rPr lang="zh-CN" altLang="en-US" sz="1200" dirty="0">
+                          <a:latin typeface="楷体" panose="02010609060101010101" pitchFamily="49" charset="-122"/>
+                          <a:ea typeface="楷体" panose="02010609060101010101" pitchFamily="49" charset="-122"/>
+                        </a:rPr>
+                        <a:t>网络总出行时间</a:t>
+                      </a:r>
+                    </a:p>
+                  </a:txBody>
+                  <a:tcPr/>
+                </a:tc>
+                <a:extLst>
+                  <a:ext uri="{0D108BD9-81ED-4DB2-BD59-A6C34878D82A}">
+                    <a16:rowId xmlns:a16="http://schemas.microsoft.com/office/drawing/2014/main" val="1944317627"/>
+                  </a:ext>
+                </a:extLst>
+              </a:tr>
+              <a:tr h="206426">
+                <a:tc>
+                  <a:txBody>
+                    <a:bodyPr/>
+                    <a:lstStyle/>
+                    <a:p>
+                      <a:pPr algn="ctr"/>
+                      <a:r>
+                        <a:rPr lang="zh-CN" altLang="en-US" sz="1200" dirty="0">
+                          <a:latin typeface="楷体" panose="02010609060101010101" pitchFamily="49" charset="-122"/>
+                          <a:ea typeface="楷体" panose="02010609060101010101" pitchFamily="49" charset="-122"/>
+                        </a:rPr>
+                        <a:t>策略</a:t>
+                      </a:r>
+                      <a:r>
+                        <a:rPr lang="en-US" altLang="zh-CN" sz="1200" dirty="0">
+                          <a:latin typeface="楷体" panose="02010609060101010101" pitchFamily="49" charset="-122"/>
+                          <a:ea typeface="楷体" panose="02010609060101010101" pitchFamily="49" charset="-122"/>
+                        </a:rPr>
+                        <a:t>1</a:t>
+                      </a:r>
+                      <a:endParaRPr lang="zh-CN" altLang="en-US" sz="1200" dirty="0">
+                        <a:latin typeface="楷体" panose="02010609060101010101" pitchFamily="49" charset="-122"/>
+                        <a:ea typeface="楷体" panose="02010609060101010101" pitchFamily="49" charset="-122"/>
+                      </a:endParaRPr>
+                    </a:p>
+                  </a:txBody>
+                  <a:tcPr/>
+                </a:tc>
+                <a:tc>
+                  <a:txBody>
+                    <a:bodyPr/>
+                    <a:lstStyle/>
+                    <a:p>
+                      <a:pPr algn="ctr"/>
+                      <a:r>
+                        <a:rPr lang="zh-CN" altLang="en-US" sz="1200" dirty="0">
+                          <a:latin typeface="楷体" panose="02010609060101010101" pitchFamily="49" charset="-122"/>
+                          <a:ea typeface="楷体" panose="02010609060101010101" pitchFamily="49" charset="-122"/>
+                        </a:rPr>
+                        <a:t>路径</a:t>
+                      </a:r>
+                      <a:r>
+                        <a:rPr lang="en-US" altLang="zh-CN" sz="1200" dirty="0">
+                          <a:latin typeface="楷体" panose="02010609060101010101" pitchFamily="49" charset="-122"/>
+                          <a:ea typeface="楷体" panose="02010609060101010101" pitchFamily="49" charset="-122"/>
+                        </a:rPr>
+                        <a:t>3</a:t>
+                      </a:r>
+                      <a:endParaRPr lang="zh-CN" altLang="en-US" sz="1200" dirty="0">
+                        <a:latin typeface="楷体" panose="02010609060101010101" pitchFamily="49" charset="-122"/>
+                        <a:ea typeface="楷体" panose="02010609060101010101" pitchFamily="49" charset="-122"/>
+                      </a:endParaRPr>
+                    </a:p>
+                  </a:txBody>
+                  <a:tcPr/>
+                </a:tc>
+                <a:tc>
+                  <a:txBody>
+                    <a:bodyPr/>
+                    <a:lstStyle/>
+                    <a:p>
+                      <a:pPr algn="ctr"/>
+                      <a:r>
+                        <a:rPr lang="zh-CN" altLang="en-US" sz="1200" dirty="0">
+                          <a:latin typeface="楷体" panose="02010609060101010101" pitchFamily="49" charset="-122"/>
+                          <a:ea typeface="楷体" panose="02010609060101010101" pitchFamily="49" charset="-122"/>
+                        </a:rPr>
+                        <a:t>路径</a:t>
+                      </a:r>
+                      <a:r>
+                        <a:rPr lang="en-US" altLang="zh-CN" sz="1200" dirty="0">
+                          <a:latin typeface="楷体" panose="02010609060101010101" pitchFamily="49" charset="-122"/>
+                          <a:ea typeface="楷体" panose="02010609060101010101" pitchFamily="49" charset="-122"/>
+                        </a:rPr>
+                        <a:t>1</a:t>
+                      </a:r>
+                      <a:r>
+                        <a:rPr lang="zh-CN" altLang="en-US" sz="1200" dirty="0">
+                          <a:latin typeface="楷体" panose="02010609060101010101" pitchFamily="49" charset="-122"/>
+                          <a:ea typeface="楷体" panose="02010609060101010101" pitchFamily="49" charset="-122"/>
+                        </a:rPr>
+                        <a:t>和路径</a:t>
+                      </a:r>
+                      <a:r>
+                        <a:rPr lang="en-US" altLang="zh-CN" sz="1200" dirty="0">
+                          <a:latin typeface="楷体" panose="02010609060101010101" pitchFamily="49" charset="-122"/>
+                          <a:ea typeface="楷体" panose="02010609060101010101" pitchFamily="49" charset="-122"/>
+                        </a:rPr>
+                        <a:t>2</a:t>
+                      </a:r>
+                      <a:endParaRPr lang="zh-CN" altLang="en-US" sz="1200" dirty="0">
+                        <a:latin typeface="楷体" panose="02010609060101010101" pitchFamily="49" charset="-122"/>
+                        <a:ea typeface="楷体" panose="02010609060101010101" pitchFamily="49" charset="-122"/>
+                      </a:endParaRPr>
+                    </a:p>
+                  </a:txBody>
+                  <a:tcPr/>
+                </a:tc>
+                <a:tc>
+                  <a:txBody>
+                    <a:bodyPr/>
+                    <a:lstStyle/>
+                    <a:p>
+                      <a:pPr algn="ctr"/>
+                      <a:r>
+                        <a:rPr lang="en-US" altLang="zh-CN" sz="1200" dirty="0">
+                          <a:latin typeface="楷体" panose="02010609060101010101" pitchFamily="49" charset="-122"/>
+                          <a:ea typeface="楷体" panose="02010609060101010101" pitchFamily="49" charset="-122"/>
+                        </a:rPr>
+                        <a:t>U1:</a:t>
+                      </a:r>
+                      <a:r>
+                        <a:rPr lang="zh-CN" altLang="en-US" sz="1200" dirty="0">
+                          <a:latin typeface="楷体" panose="02010609060101010101" pitchFamily="49" charset="-122"/>
+                          <a:ea typeface="楷体" panose="02010609060101010101" pitchFamily="49" charset="-122"/>
+                        </a:rPr>
+                        <a:t>路径</a:t>
+                      </a:r>
+                      <a:r>
+                        <a:rPr lang="en-US" altLang="zh-CN" sz="1200" dirty="0">
+                          <a:latin typeface="楷体" panose="02010609060101010101" pitchFamily="49" charset="-122"/>
+                          <a:ea typeface="楷体" panose="02010609060101010101" pitchFamily="49" charset="-122"/>
+                        </a:rPr>
+                        <a:t>3;U2:</a:t>
+                      </a:r>
+                      <a:r>
+                        <a:rPr lang="zh-CN" altLang="en-US" sz="1200" dirty="0">
+                          <a:latin typeface="楷体" panose="02010609060101010101" pitchFamily="49" charset="-122"/>
+                          <a:ea typeface="楷体" panose="02010609060101010101" pitchFamily="49" charset="-122"/>
+                        </a:rPr>
+                        <a:t>路径</a:t>
+                      </a:r>
+                      <a:r>
+                        <a:rPr lang="en-US" altLang="zh-CN" sz="1200" dirty="0">
+                          <a:latin typeface="楷体" panose="02010609060101010101" pitchFamily="49" charset="-122"/>
+                          <a:ea typeface="楷体" panose="02010609060101010101" pitchFamily="49" charset="-122"/>
+                        </a:rPr>
+                        <a:t>1</a:t>
+                      </a:r>
+                      <a:endParaRPr lang="zh-CN" altLang="en-US" sz="1200" dirty="0">
+                        <a:latin typeface="楷体" panose="02010609060101010101" pitchFamily="49" charset="-122"/>
+                        <a:ea typeface="楷体" panose="02010609060101010101" pitchFamily="49" charset="-122"/>
+                      </a:endParaRPr>
+                    </a:p>
+                  </a:txBody>
+                  <a:tcPr/>
+                </a:tc>
+                <a:tc>
+                  <a:txBody>
+                    <a:bodyPr/>
+                    <a:lstStyle/>
+                    <a:p>
+                      <a:pPr algn="ctr"/>
+                      <a:r>
+                        <a:rPr lang="en-US" altLang="zh-CN" sz="1200" dirty="0">
+                          <a:latin typeface="楷体" panose="02010609060101010101" pitchFamily="49" charset="-122"/>
+                          <a:ea typeface="楷体" panose="02010609060101010101" pitchFamily="49" charset="-122"/>
+                        </a:rPr>
+                        <a:t>2100 min</a:t>
+                      </a:r>
+                      <a:endParaRPr lang="zh-CN" altLang="en-US" sz="1200" dirty="0">
+                        <a:latin typeface="楷体" panose="02010609060101010101" pitchFamily="49" charset="-122"/>
+                        <a:ea typeface="楷体" panose="02010609060101010101" pitchFamily="49" charset="-122"/>
+                      </a:endParaRPr>
+                    </a:p>
+                  </a:txBody>
+                  <a:tcPr/>
+                </a:tc>
+                <a:extLst>
+                  <a:ext uri="{0D108BD9-81ED-4DB2-BD59-A6C34878D82A}">
+                    <a16:rowId xmlns:a16="http://schemas.microsoft.com/office/drawing/2014/main" val="3247717937"/>
+                  </a:ext>
+                </a:extLst>
+              </a:tr>
+              <a:tr h="206426">
+                <a:tc>
+                  <a:txBody>
+                    <a:bodyPr/>
+                    <a:lstStyle/>
+                    <a:p>
+                      <a:pPr algn="ctr"/>
+                      <a:r>
+                        <a:rPr lang="zh-CN" altLang="en-US" sz="1200" dirty="0">
+                          <a:latin typeface="楷体" panose="02010609060101010101" pitchFamily="49" charset="-122"/>
+                          <a:ea typeface="楷体" panose="02010609060101010101" pitchFamily="49" charset="-122"/>
+                        </a:rPr>
+                        <a:t>策略</a:t>
+                      </a:r>
+                      <a:r>
+                        <a:rPr lang="en-US" altLang="zh-CN" sz="1200" dirty="0">
+                          <a:latin typeface="楷体" panose="02010609060101010101" pitchFamily="49" charset="-122"/>
+                          <a:ea typeface="楷体" panose="02010609060101010101" pitchFamily="49" charset="-122"/>
+                        </a:rPr>
+                        <a:t>2</a:t>
+                      </a:r>
+                      <a:endParaRPr lang="zh-CN" altLang="en-US" sz="1200" dirty="0">
+                        <a:latin typeface="楷体" panose="02010609060101010101" pitchFamily="49" charset="-122"/>
+                        <a:ea typeface="楷体" panose="02010609060101010101" pitchFamily="49" charset="-122"/>
+                      </a:endParaRPr>
+                    </a:p>
+                  </a:txBody>
+                  <a:tcPr/>
+                </a:tc>
+                <a:tc>
+                  <a:txBody>
+                    <a:bodyPr/>
+                    <a:lstStyle/>
+                    <a:p>
+                      <a:pPr algn="ctr"/>
+                      <a:r>
+                        <a:rPr lang="zh-CN" altLang="en-US" sz="1200" dirty="0">
+                          <a:latin typeface="楷体" panose="02010609060101010101" pitchFamily="49" charset="-122"/>
+                          <a:ea typeface="楷体" panose="02010609060101010101" pitchFamily="49" charset="-122"/>
+                        </a:rPr>
+                        <a:t>路径</a:t>
+                      </a:r>
+                      <a:r>
+                        <a:rPr lang="en-US" altLang="zh-CN" sz="1200" dirty="0">
+                          <a:latin typeface="楷体" panose="02010609060101010101" pitchFamily="49" charset="-122"/>
+                          <a:ea typeface="楷体" panose="02010609060101010101" pitchFamily="49" charset="-122"/>
+                        </a:rPr>
+                        <a:t>3</a:t>
+                      </a:r>
+                      <a:endParaRPr lang="zh-CN" altLang="en-US" sz="1200" dirty="0">
+                        <a:latin typeface="楷体" panose="02010609060101010101" pitchFamily="49" charset="-122"/>
+                        <a:ea typeface="楷体" panose="02010609060101010101" pitchFamily="49" charset="-122"/>
+                      </a:endParaRPr>
+                    </a:p>
+                  </a:txBody>
+                  <a:tcPr/>
+                </a:tc>
+                <a:tc>
+                  <a:txBody>
+                    <a:bodyPr/>
+                    <a:lstStyle/>
+                    <a:p>
+                      <a:pPr algn="ctr"/>
+                      <a:r>
+                        <a:rPr lang="zh-CN" altLang="en-US" sz="1200" dirty="0">
+                          <a:latin typeface="楷体" panose="02010609060101010101" pitchFamily="49" charset="-122"/>
+                          <a:ea typeface="楷体" panose="02010609060101010101" pitchFamily="49" charset="-122"/>
+                        </a:rPr>
+                        <a:t>路径</a:t>
+                      </a:r>
+                      <a:r>
+                        <a:rPr lang="en-US" altLang="zh-CN" sz="1200" dirty="0">
+                          <a:latin typeface="楷体" panose="02010609060101010101" pitchFamily="49" charset="-122"/>
+                          <a:ea typeface="楷体" panose="02010609060101010101" pitchFamily="49" charset="-122"/>
+                        </a:rPr>
+                        <a:t>2</a:t>
+                      </a:r>
+                      <a:endParaRPr lang="zh-CN" altLang="en-US" sz="1200" dirty="0">
+                        <a:latin typeface="楷体" panose="02010609060101010101" pitchFamily="49" charset="-122"/>
+                        <a:ea typeface="楷体" panose="02010609060101010101" pitchFamily="49" charset="-122"/>
+                      </a:endParaRPr>
+                    </a:p>
+                  </a:txBody>
+                  <a:tcPr/>
+                </a:tc>
+                <a:tc>
+                  <a:txBody>
+                    <a:bodyPr/>
+                    <a:lstStyle/>
+                    <a:p>
+                      <a:pPr algn="ctr"/>
+                      <a:r>
+                        <a:rPr lang="en-US" altLang="zh-CN" sz="1200" dirty="0">
+                          <a:latin typeface="楷体" panose="02010609060101010101" pitchFamily="49" charset="-122"/>
+                          <a:ea typeface="楷体" panose="02010609060101010101" pitchFamily="49" charset="-122"/>
+                        </a:rPr>
+                        <a:t>U1:</a:t>
+                      </a:r>
+                      <a:r>
+                        <a:rPr lang="zh-CN" altLang="en-US" sz="1200" dirty="0">
+                          <a:latin typeface="楷体" panose="02010609060101010101" pitchFamily="49" charset="-122"/>
+                          <a:ea typeface="楷体" panose="02010609060101010101" pitchFamily="49" charset="-122"/>
+                        </a:rPr>
+                        <a:t>路径</a:t>
+                      </a:r>
+                      <a:r>
+                        <a:rPr lang="en-US" altLang="zh-CN" sz="1200" dirty="0">
+                          <a:latin typeface="楷体" panose="02010609060101010101" pitchFamily="49" charset="-122"/>
+                          <a:ea typeface="楷体" panose="02010609060101010101" pitchFamily="49" charset="-122"/>
+                        </a:rPr>
+                        <a:t>3;U2:</a:t>
+                      </a:r>
+                      <a:r>
+                        <a:rPr lang="zh-CN" altLang="en-US" sz="1200" dirty="0">
+                          <a:latin typeface="楷体" panose="02010609060101010101" pitchFamily="49" charset="-122"/>
+                          <a:ea typeface="楷体" panose="02010609060101010101" pitchFamily="49" charset="-122"/>
+                        </a:rPr>
+                        <a:t>路径</a:t>
+                      </a:r>
+                      <a:r>
+                        <a:rPr lang="en-US" altLang="zh-CN" sz="1200" dirty="0">
+                          <a:latin typeface="楷体" panose="02010609060101010101" pitchFamily="49" charset="-122"/>
+                          <a:ea typeface="楷体" panose="02010609060101010101" pitchFamily="49" charset="-122"/>
+                        </a:rPr>
+                        <a:t>2</a:t>
+                      </a:r>
+                      <a:endParaRPr lang="zh-CN" altLang="en-US" sz="1200" dirty="0">
+                        <a:latin typeface="楷体" panose="02010609060101010101" pitchFamily="49" charset="-122"/>
+                        <a:ea typeface="楷体" panose="02010609060101010101" pitchFamily="49" charset="-122"/>
+                      </a:endParaRPr>
+                    </a:p>
+                  </a:txBody>
+                  <a:tcPr/>
+                </a:tc>
+                <a:tc>
+                  <a:txBody>
+                    <a:bodyPr/>
+                    <a:lstStyle/>
+                    <a:p>
+                      <a:pPr algn="ctr"/>
+                      <a:r>
+                        <a:rPr lang="en-US" altLang="zh-CN" sz="1200" dirty="0">
+                          <a:latin typeface="楷体" panose="02010609060101010101" pitchFamily="49" charset="-122"/>
+                          <a:ea typeface="楷体" panose="02010609060101010101" pitchFamily="49" charset="-122"/>
+                        </a:rPr>
+                        <a:t>2000 min</a:t>
+                      </a:r>
+                      <a:endParaRPr lang="zh-CN" altLang="en-US" sz="1200" dirty="0">
+                        <a:latin typeface="楷体" panose="02010609060101010101" pitchFamily="49" charset="-122"/>
+                        <a:ea typeface="楷体" panose="02010609060101010101" pitchFamily="49" charset="-122"/>
+                      </a:endParaRPr>
+                    </a:p>
+                  </a:txBody>
+                  <a:tcPr/>
+                </a:tc>
+                <a:extLst>
+                  <a:ext uri="{0D108BD9-81ED-4DB2-BD59-A6C34878D82A}">
+                    <a16:rowId xmlns:a16="http://schemas.microsoft.com/office/drawing/2014/main" val="4182064883"/>
+                  </a:ext>
+                </a:extLst>
+              </a:tr>
+            </a:tbl>
+          </a:graphicData>
+        </a:graphic>
+      </p:graphicFrame>
+      <p:grpSp>
+        <p:nvGrpSpPr>
+          <p:cNvPr id="63" name="组合 62">
+            <a:extLst>
+              <a:ext uri="{FF2B5EF4-FFF2-40B4-BE49-F238E27FC236}">
+                <a16:creationId xmlns:a16="http://schemas.microsoft.com/office/drawing/2014/main" id="{8CA24893-B074-47B4-B82F-56D23D04DC69}"/>
+              </a:ext>
+            </a:extLst>
+          </p:cNvPr>
+          <p:cNvGrpSpPr/>
           <p:nvPr/>
-        </p:nvPicPr>
-        <p:blipFill>
-          <a:blip r:embed="rId2">
-            <a:extLst>
-              <a:ext uri="{28A0092B-C50C-407E-A947-70E740481C1C}">
-                <a14:useLocalDpi xmlns:a14="http://schemas.microsoft.com/office/drawing/2010/main" val="0"/>
-              </a:ext>
-            </a:extLst>
-          </a:blip>
-          <a:stretch>
-            <a:fillRect/>
-          </a:stretch>
-        </p:blipFill>
-        <p:spPr>
+        </p:nvGrpSpPr>
+        <p:grpSpPr>
           <a:xfrm>
-            <a:off x="1207827" y="611164"/>
-            <a:ext cx="7558523" cy="5243726"/>
+            <a:off x="2092504" y="2409844"/>
+            <a:ext cx="5892983" cy="1519663"/>
+            <a:chOff x="1903911" y="2409844"/>
+            <a:chExt cx="5892983" cy="1519663"/>
           </a:xfrm>
-          <a:prstGeom prst="rect">
-            <a:avLst/>
-          </a:prstGeom>
-        </p:spPr>
-      </p:pic>
+        </p:grpSpPr>
+        <p:cxnSp>
+          <p:nvCxnSpPr>
+            <p:cNvPr id="28" name="直接箭头连接符 27">
+              <a:extLst>
+                <a:ext uri="{FF2B5EF4-FFF2-40B4-BE49-F238E27FC236}">
+                  <a16:creationId xmlns:a16="http://schemas.microsoft.com/office/drawing/2014/main" id="{A384EB58-B388-42E7-BCDE-37A7D84FE812}"/>
+                </a:ext>
+              </a:extLst>
+            </p:cNvPr>
+            <p:cNvCxnSpPr>
+              <a:cxnSpLocks/>
+            </p:cNvCxnSpPr>
+            <p:nvPr/>
+          </p:nvCxnSpPr>
+          <p:spPr>
+            <a:xfrm flipV="1">
+              <a:off x="2191294" y="2781056"/>
+              <a:ext cx="966652" cy="979713"/>
+            </a:xfrm>
+            <a:prstGeom prst="straightConnector1">
+              <a:avLst/>
+            </a:prstGeom>
+            <a:ln w="19050">
+              <a:solidFill>
+                <a:srgbClr val="00B0F0"/>
+              </a:solidFill>
+              <a:tailEnd type="triangle"/>
+            </a:ln>
+          </p:spPr>
+          <p:style>
+            <a:lnRef idx="1">
+              <a:schemeClr val="accent1"/>
+            </a:lnRef>
+            <a:fillRef idx="0">
+              <a:schemeClr val="accent1"/>
+            </a:fillRef>
+            <a:effectRef idx="0">
+              <a:schemeClr val="accent1"/>
+            </a:effectRef>
+            <a:fontRef idx="minor">
+              <a:schemeClr val="tx1"/>
+            </a:fontRef>
+          </p:style>
+        </p:cxnSp>
+        <p:cxnSp>
+          <p:nvCxnSpPr>
+            <p:cNvPr id="31" name="直接箭头连接符 30">
+              <a:extLst>
+                <a:ext uri="{FF2B5EF4-FFF2-40B4-BE49-F238E27FC236}">
+                  <a16:creationId xmlns:a16="http://schemas.microsoft.com/office/drawing/2014/main" id="{8EA97A91-BCB0-486A-AD4F-632DA79A40BB}"/>
+                </a:ext>
+              </a:extLst>
+            </p:cNvPr>
+            <p:cNvCxnSpPr>
+              <a:cxnSpLocks/>
+            </p:cNvCxnSpPr>
+            <p:nvPr/>
+          </p:nvCxnSpPr>
+          <p:spPr>
+            <a:xfrm>
+              <a:off x="3157946" y="2774523"/>
+              <a:ext cx="1750423" cy="6532"/>
+            </a:xfrm>
+            <a:prstGeom prst="straightConnector1">
+              <a:avLst/>
+            </a:prstGeom>
+            <a:ln w="19050">
+              <a:solidFill>
+                <a:srgbClr val="00B0F0"/>
+              </a:solidFill>
+              <a:tailEnd type="triangle"/>
+            </a:ln>
+          </p:spPr>
+          <p:style>
+            <a:lnRef idx="1">
+              <a:schemeClr val="accent1"/>
+            </a:lnRef>
+            <a:fillRef idx="0">
+              <a:schemeClr val="accent1"/>
+            </a:fillRef>
+            <a:effectRef idx="0">
+              <a:schemeClr val="accent1"/>
+            </a:effectRef>
+            <a:fontRef idx="minor">
+              <a:schemeClr val="tx1"/>
+            </a:fontRef>
+          </p:style>
+        </p:cxnSp>
+        <p:cxnSp>
+          <p:nvCxnSpPr>
+            <p:cNvPr id="34" name="直接箭头连接符 33">
+              <a:extLst>
+                <a:ext uri="{FF2B5EF4-FFF2-40B4-BE49-F238E27FC236}">
+                  <a16:creationId xmlns:a16="http://schemas.microsoft.com/office/drawing/2014/main" id="{047E3E4A-B4C6-472E-9F07-5B223DAD938B}"/>
+                </a:ext>
+              </a:extLst>
+            </p:cNvPr>
+            <p:cNvCxnSpPr>
+              <a:cxnSpLocks/>
+            </p:cNvCxnSpPr>
+            <p:nvPr/>
+          </p:nvCxnSpPr>
+          <p:spPr>
+            <a:xfrm>
+              <a:off x="4914900" y="2781055"/>
+              <a:ext cx="1047748" cy="939649"/>
+            </a:xfrm>
+            <a:prstGeom prst="straightConnector1">
+              <a:avLst/>
+            </a:prstGeom>
+            <a:ln w="19050">
+              <a:solidFill>
+                <a:srgbClr val="00B0F0"/>
+              </a:solidFill>
+              <a:tailEnd type="triangle"/>
+            </a:ln>
+          </p:spPr>
+          <p:style>
+            <a:lnRef idx="1">
+              <a:schemeClr val="accent1"/>
+            </a:lnRef>
+            <a:fillRef idx="0">
+              <a:schemeClr val="accent1"/>
+            </a:fillRef>
+            <a:effectRef idx="0">
+              <a:schemeClr val="accent1"/>
+            </a:effectRef>
+            <a:fontRef idx="minor">
+              <a:schemeClr val="tx1"/>
+            </a:fontRef>
+          </p:style>
+        </p:cxnSp>
+        <p:sp>
+          <p:nvSpPr>
+            <p:cNvPr id="36" name="文本框 35">
+              <a:extLst>
+                <a:ext uri="{FF2B5EF4-FFF2-40B4-BE49-F238E27FC236}">
+                  <a16:creationId xmlns:a16="http://schemas.microsoft.com/office/drawing/2014/main" id="{787F9AE8-A512-44BB-8161-6F2F3DF390CB}"/>
+                </a:ext>
+              </a:extLst>
+            </p:cNvPr>
+            <p:cNvSpPr txBox="1"/>
+            <p:nvPr/>
+          </p:nvSpPr>
+          <p:spPr>
+            <a:xfrm>
+              <a:off x="1903911" y="3590953"/>
+              <a:ext cx="248195" cy="338554"/>
+            </a:xfrm>
+            <a:prstGeom prst="rect">
+              <a:avLst/>
+            </a:prstGeom>
+            <a:noFill/>
+          </p:spPr>
+          <p:txBody>
+            <a:bodyPr wrap="square" rtlCol="0">
+              <a:spAutoFit/>
+            </a:bodyPr>
+            <a:lstStyle/>
+            <a:p>
+              <a:r>
+                <a:rPr lang="en-US" altLang="zh-CN" sz="1600" dirty="0">
+                  <a:latin typeface="Times New Roman" panose="02020603050405020304" pitchFamily="18" charset="0"/>
+                  <a:ea typeface="楷体" panose="02010609060101010101" pitchFamily="49" charset="-122"/>
+                  <a:cs typeface="Times New Roman" panose="02020603050405020304" pitchFamily="18" charset="0"/>
+                </a:rPr>
+                <a:t>A</a:t>
+              </a:r>
+              <a:endParaRPr lang="zh-CN" altLang="en-US" sz="1600" dirty="0">
+                <a:latin typeface="Times New Roman" panose="02020603050405020304" pitchFamily="18" charset="0"/>
+                <a:ea typeface="楷体" panose="02010609060101010101" pitchFamily="49" charset="-122"/>
+                <a:cs typeface="Times New Roman" panose="02020603050405020304" pitchFamily="18" charset="0"/>
+              </a:endParaRPr>
+            </a:p>
+          </p:txBody>
+        </p:sp>
+        <p:sp>
+          <p:nvSpPr>
+            <p:cNvPr id="37" name="文本框 36">
+              <a:extLst>
+                <a:ext uri="{FF2B5EF4-FFF2-40B4-BE49-F238E27FC236}">
+                  <a16:creationId xmlns:a16="http://schemas.microsoft.com/office/drawing/2014/main" id="{D6024D27-A129-4915-A612-BE516253C2D1}"/>
+                </a:ext>
+              </a:extLst>
+            </p:cNvPr>
+            <p:cNvSpPr txBox="1"/>
+            <p:nvPr/>
+          </p:nvSpPr>
+          <p:spPr>
+            <a:xfrm>
+              <a:off x="2981596" y="2409844"/>
+              <a:ext cx="248195" cy="338554"/>
+            </a:xfrm>
+            <a:prstGeom prst="rect">
+              <a:avLst/>
+            </a:prstGeom>
+            <a:noFill/>
+          </p:spPr>
+          <p:txBody>
+            <a:bodyPr wrap="square" rtlCol="0">
+              <a:spAutoFit/>
+            </a:bodyPr>
+            <a:lstStyle/>
+            <a:p>
+              <a:r>
+                <a:rPr lang="en-US" altLang="zh-CN" sz="1600" dirty="0">
+                  <a:latin typeface="Times New Roman" panose="02020603050405020304" pitchFamily="18" charset="0"/>
+                  <a:ea typeface="楷体" panose="02010609060101010101" pitchFamily="49" charset="-122"/>
+                  <a:cs typeface="Times New Roman" panose="02020603050405020304" pitchFamily="18" charset="0"/>
+                </a:rPr>
+                <a:t>B</a:t>
+              </a:r>
+              <a:endParaRPr lang="zh-CN" altLang="en-US" sz="1600" dirty="0">
+                <a:latin typeface="Times New Roman" panose="02020603050405020304" pitchFamily="18" charset="0"/>
+                <a:ea typeface="楷体" panose="02010609060101010101" pitchFamily="49" charset="-122"/>
+                <a:cs typeface="Times New Roman" panose="02020603050405020304" pitchFamily="18" charset="0"/>
+              </a:endParaRPr>
+            </a:p>
+          </p:txBody>
+        </p:sp>
+        <p:sp>
+          <p:nvSpPr>
+            <p:cNvPr id="38" name="文本框 37">
+              <a:extLst>
+                <a:ext uri="{FF2B5EF4-FFF2-40B4-BE49-F238E27FC236}">
+                  <a16:creationId xmlns:a16="http://schemas.microsoft.com/office/drawing/2014/main" id="{70EBC029-CFB1-4D4C-A213-96A1C477D7D5}"/>
+                </a:ext>
+              </a:extLst>
+            </p:cNvPr>
+            <p:cNvSpPr txBox="1"/>
+            <p:nvPr/>
+          </p:nvSpPr>
+          <p:spPr>
+            <a:xfrm>
+              <a:off x="4790802" y="2442501"/>
+              <a:ext cx="248195" cy="338554"/>
+            </a:xfrm>
+            <a:prstGeom prst="rect">
+              <a:avLst/>
+            </a:prstGeom>
+            <a:noFill/>
+          </p:spPr>
+          <p:txBody>
+            <a:bodyPr wrap="square" rtlCol="0">
+              <a:spAutoFit/>
+            </a:bodyPr>
+            <a:lstStyle/>
+            <a:p>
+              <a:r>
+                <a:rPr lang="en-US" altLang="zh-CN" sz="1600" dirty="0">
+                  <a:latin typeface="Times New Roman" panose="02020603050405020304" pitchFamily="18" charset="0"/>
+                  <a:ea typeface="楷体" panose="02010609060101010101" pitchFamily="49" charset="-122"/>
+                  <a:cs typeface="Times New Roman" panose="02020603050405020304" pitchFamily="18" charset="0"/>
+                </a:rPr>
+                <a:t>C</a:t>
+              </a:r>
+              <a:endParaRPr lang="zh-CN" altLang="en-US" sz="1600" dirty="0">
+                <a:latin typeface="Times New Roman" panose="02020603050405020304" pitchFamily="18" charset="0"/>
+                <a:ea typeface="楷体" panose="02010609060101010101" pitchFamily="49" charset="-122"/>
+                <a:cs typeface="Times New Roman" panose="02020603050405020304" pitchFamily="18" charset="0"/>
+              </a:endParaRPr>
+            </a:p>
+          </p:txBody>
+        </p:sp>
+        <p:sp>
+          <p:nvSpPr>
+            <p:cNvPr id="39" name="文本框 38">
+              <a:extLst>
+                <a:ext uri="{FF2B5EF4-FFF2-40B4-BE49-F238E27FC236}">
+                  <a16:creationId xmlns:a16="http://schemas.microsoft.com/office/drawing/2014/main" id="{7A983DE1-12C3-46FC-AD52-31CA565A6593}"/>
+                </a:ext>
+              </a:extLst>
+            </p:cNvPr>
+            <p:cNvSpPr txBox="1"/>
+            <p:nvPr/>
+          </p:nvSpPr>
+          <p:spPr>
+            <a:xfrm>
+              <a:off x="5943602" y="3561553"/>
+              <a:ext cx="248195" cy="338554"/>
+            </a:xfrm>
+            <a:prstGeom prst="rect">
+              <a:avLst/>
+            </a:prstGeom>
+            <a:noFill/>
+          </p:spPr>
+          <p:txBody>
+            <a:bodyPr wrap="square" rtlCol="0">
+              <a:spAutoFit/>
+            </a:bodyPr>
+            <a:lstStyle/>
+            <a:p>
+              <a:r>
+                <a:rPr lang="en-US" altLang="zh-CN" sz="1600" dirty="0">
+                  <a:latin typeface="Times New Roman" panose="02020603050405020304" pitchFamily="18" charset="0"/>
+                  <a:ea typeface="楷体" panose="02010609060101010101" pitchFamily="49" charset="-122"/>
+                  <a:cs typeface="Times New Roman" panose="02020603050405020304" pitchFamily="18" charset="0"/>
+                </a:rPr>
+                <a:t>D</a:t>
+              </a:r>
+              <a:endParaRPr lang="zh-CN" altLang="en-US" sz="1600" dirty="0">
+                <a:latin typeface="Times New Roman" panose="02020603050405020304" pitchFamily="18" charset="0"/>
+                <a:ea typeface="楷体" panose="02010609060101010101" pitchFamily="49" charset="-122"/>
+                <a:cs typeface="Times New Roman" panose="02020603050405020304" pitchFamily="18" charset="0"/>
+              </a:endParaRPr>
+            </a:p>
+          </p:txBody>
+        </p:sp>
+        <p:sp>
+          <p:nvSpPr>
+            <p:cNvPr id="40" name="椭圆 39">
+              <a:extLst>
+                <a:ext uri="{FF2B5EF4-FFF2-40B4-BE49-F238E27FC236}">
+                  <a16:creationId xmlns:a16="http://schemas.microsoft.com/office/drawing/2014/main" id="{5E526C94-5E0B-40B3-899D-58DDCBCE4D78}"/>
+                </a:ext>
+              </a:extLst>
+            </p:cNvPr>
+            <p:cNvSpPr/>
+            <p:nvPr/>
+          </p:nvSpPr>
+          <p:spPr>
+            <a:xfrm>
+              <a:off x="4891499" y="2752755"/>
+              <a:ext cx="65314" cy="65314"/>
+            </a:xfrm>
+            <a:prstGeom prst="ellipse">
+              <a:avLst/>
+            </a:prstGeom>
+            <a:solidFill>
+              <a:schemeClr val="tx1"/>
+            </a:solidFill>
+            <a:ln>
+              <a:noFill/>
+            </a:ln>
+          </p:spPr>
+          <p:style>
+            <a:lnRef idx="2">
+              <a:schemeClr val="accent1">
+                <a:shade val="50000"/>
+              </a:schemeClr>
+            </a:lnRef>
+            <a:fillRef idx="1">
+              <a:schemeClr val="accent1"/>
+            </a:fillRef>
+            <a:effectRef idx="0">
+              <a:schemeClr val="accent1"/>
+            </a:effectRef>
+            <a:fontRef idx="minor">
+              <a:schemeClr val="lt1"/>
+            </a:fontRef>
+          </p:style>
+          <p:txBody>
+            <a:bodyPr rtlCol="0" anchor="ctr"/>
+            <a:lstStyle/>
+            <a:p>
+              <a:pPr algn="ctr"/>
+              <a:endParaRPr lang="zh-CN" altLang="en-US"/>
+            </a:p>
+          </p:txBody>
+        </p:sp>
+        <p:sp>
+          <p:nvSpPr>
+            <p:cNvPr id="41" name="椭圆 40">
+              <a:extLst>
+                <a:ext uri="{FF2B5EF4-FFF2-40B4-BE49-F238E27FC236}">
+                  <a16:creationId xmlns:a16="http://schemas.microsoft.com/office/drawing/2014/main" id="{049025A4-25DD-4ADB-BCA9-49B9736DAA2F}"/>
+                </a:ext>
+              </a:extLst>
+            </p:cNvPr>
+            <p:cNvSpPr/>
+            <p:nvPr/>
+          </p:nvSpPr>
+          <p:spPr>
+            <a:xfrm>
+              <a:off x="2178232" y="3730290"/>
+              <a:ext cx="65314" cy="65314"/>
+            </a:xfrm>
+            <a:prstGeom prst="ellipse">
+              <a:avLst/>
+            </a:prstGeom>
+            <a:solidFill>
+              <a:schemeClr val="tx1"/>
+            </a:solidFill>
+            <a:ln>
+              <a:noFill/>
+            </a:ln>
+          </p:spPr>
+          <p:style>
+            <a:lnRef idx="2">
+              <a:schemeClr val="accent1">
+                <a:shade val="50000"/>
+              </a:schemeClr>
+            </a:lnRef>
+            <a:fillRef idx="1">
+              <a:schemeClr val="accent1"/>
+            </a:fillRef>
+            <a:effectRef idx="0">
+              <a:schemeClr val="accent1"/>
+            </a:effectRef>
+            <a:fontRef idx="minor">
+              <a:schemeClr val="lt1"/>
+            </a:fontRef>
+          </p:style>
+          <p:txBody>
+            <a:bodyPr rtlCol="0" anchor="ctr"/>
+            <a:lstStyle/>
+            <a:p>
+              <a:pPr algn="ctr"/>
+              <a:endParaRPr lang="zh-CN" altLang="en-US"/>
+            </a:p>
+          </p:txBody>
+        </p:sp>
+        <p:sp>
+          <p:nvSpPr>
+            <p:cNvPr id="42" name="椭圆 41">
+              <a:extLst>
+                <a:ext uri="{FF2B5EF4-FFF2-40B4-BE49-F238E27FC236}">
+                  <a16:creationId xmlns:a16="http://schemas.microsoft.com/office/drawing/2014/main" id="{FB06DFB6-4954-4A16-BA26-B4CCD5B4D4E0}"/>
+                </a:ext>
+              </a:extLst>
+            </p:cNvPr>
+            <p:cNvSpPr/>
+            <p:nvPr/>
+          </p:nvSpPr>
+          <p:spPr>
+            <a:xfrm>
+              <a:off x="5937071" y="3730290"/>
+              <a:ext cx="65314" cy="65314"/>
+            </a:xfrm>
+            <a:prstGeom prst="ellipse">
+              <a:avLst/>
+            </a:prstGeom>
+            <a:solidFill>
+              <a:schemeClr val="tx1"/>
+            </a:solidFill>
+            <a:ln>
+              <a:noFill/>
+            </a:ln>
+          </p:spPr>
+          <p:style>
+            <a:lnRef idx="2">
+              <a:schemeClr val="accent1">
+                <a:shade val="50000"/>
+              </a:schemeClr>
+            </a:lnRef>
+            <a:fillRef idx="1">
+              <a:schemeClr val="accent1"/>
+            </a:fillRef>
+            <a:effectRef idx="0">
+              <a:schemeClr val="accent1"/>
+            </a:effectRef>
+            <a:fontRef idx="minor">
+              <a:schemeClr val="lt1"/>
+            </a:fontRef>
+          </p:style>
+          <p:txBody>
+            <a:bodyPr rtlCol="0" anchor="ctr"/>
+            <a:lstStyle/>
+            <a:p>
+              <a:pPr algn="ctr"/>
+              <a:endParaRPr lang="zh-CN" altLang="en-US"/>
+            </a:p>
+          </p:txBody>
+        </p:sp>
+        <p:sp>
+          <p:nvSpPr>
+            <p:cNvPr id="43" name="椭圆 42">
+              <a:extLst>
+                <a:ext uri="{FF2B5EF4-FFF2-40B4-BE49-F238E27FC236}">
+                  <a16:creationId xmlns:a16="http://schemas.microsoft.com/office/drawing/2014/main" id="{131F451D-E73E-4E82-8102-CC6E4BDC0710}"/>
+                </a:ext>
+              </a:extLst>
+            </p:cNvPr>
+            <p:cNvSpPr/>
+            <p:nvPr/>
+          </p:nvSpPr>
+          <p:spPr>
+            <a:xfrm>
+              <a:off x="3135086" y="2741866"/>
+              <a:ext cx="65314" cy="65314"/>
+            </a:xfrm>
+            <a:prstGeom prst="ellipse">
+              <a:avLst/>
+            </a:prstGeom>
+            <a:solidFill>
+              <a:schemeClr val="tx1"/>
+            </a:solidFill>
+            <a:ln>
+              <a:noFill/>
+            </a:ln>
+          </p:spPr>
+          <p:style>
+            <a:lnRef idx="2">
+              <a:schemeClr val="accent1">
+                <a:shade val="50000"/>
+              </a:schemeClr>
+            </a:lnRef>
+            <a:fillRef idx="1">
+              <a:schemeClr val="accent1"/>
+            </a:fillRef>
+            <a:effectRef idx="0">
+              <a:schemeClr val="accent1"/>
+            </a:effectRef>
+            <a:fontRef idx="minor">
+              <a:schemeClr val="lt1"/>
+            </a:fontRef>
+          </p:style>
+          <p:txBody>
+            <a:bodyPr rtlCol="0" anchor="ctr"/>
+            <a:lstStyle/>
+            <a:p>
+              <a:pPr algn="ctr"/>
+              <a:endParaRPr lang="zh-CN" altLang="en-US"/>
+            </a:p>
+          </p:txBody>
+        </p:sp>
+        <p:sp>
+          <p:nvSpPr>
+            <p:cNvPr id="49" name="文本框 48">
+              <a:extLst>
+                <a:ext uri="{FF2B5EF4-FFF2-40B4-BE49-F238E27FC236}">
+                  <a16:creationId xmlns:a16="http://schemas.microsoft.com/office/drawing/2014/main" id="{61CC5AFD-FD9C-45F2-AD2B-EEFCB4746EA8}"/>
+                </a:ext>
+              </a:extLst>
+            </p:cNvPr>
+            <p:cNvSpPr txBox="1"/>
+            <p:nvPr/>
+          </p:nvSpPr>
+          <p:spPr>
+            <a:xfrm>
+              <a:off x="3758837" y="3453291"/>
+              <a:ext cx="738052" cy="276999"/>
+            </a:xfrm>
+            <a:prstGeom prst="rect">
+              <a:avLst/>
+            </a:prstGeom>
+            <a:noFill/>
+          </p:spPr>
+          <p:txBody>
+            <a:bodyPr wrap="square" rtlCol="0">
+              <a:spAutoFit/>
+            </a:bodyPr>
+            <a:lstStyle/>
+            <a:p>
+              <a:r>
+                <a:rPr lang="en-US" altLang="zh-CN" sz="1200" dirty="0">
+                  <a:latin typeface="楷体" panose="02010609060101010101" pitchFamily="49" charset="-122"/>
+                  <a:ea typeface="楷体" panose="02010609060101010101" pitchFamily="49" charset="-122"/>
+                </a:rPr>
+                <a:t>120min</a:t>
+              </a:r>
+              <a:endParaRPr lang="zh-CN" altLang="en-US" sz="1200" dirty="0">
+                <a:latin typeface="楷体" panose="02010609060101010101" pitchFamily="49" charset="-122"/>
+                <a:ea typeface="楷体" panose="02010609060101010101" pitchFamily="49" charset="-122"/>
+              </a:endParaRPr>
+            </a:p>
+          </p:txBody>
+        </p:sp>
+        <p:sp>
+          <p:nvSpPr>
+            <p:cNvPr id="50" name="文本框 49">
+              <a:extLst>
+                <a:ext uri="{FF2B5EF4-FFF2-40B4-BE49-F238E27FC236}">
+                  <a16:creationId xmlns:a16="http://schemas.microsoft.com/office/drawing/2014/main" id="{FCDE4FEE-B6A6-493E-9134-A61A53F24EAD}"/>
+                </a:ext>
+              </a:extLst>
+            </p:cNvPr>
+            <p:cNvSpPr txBox="1"/>
+            <p:nvPr/>
+          </p:nvSpPr>
+          <p:spPr>
+            <a:xfrm>
+              <a:off x="1943097" y="2976496"/>
+              <a:ext cx="966652" cy="276999"/>
+            </a:xfrm>
+            <a:prstGeom prst="rect">
+              <a:avLst/>
+            </a:prstGeom>
+            <a:noFill/>
+          </p:spPr>
+          <p:txBody>
+            <a:bodyPr wrap="square" rtlCol="0">
+              <a:spAutoFit/>
+            </a:bodyPr>
+            <a:lstStyle/>
+            <a:p>
+              <a:r>
+                <a:rPr lang="en-US" altLang="zh-CN" sz="1200" dirty="0">
+                  <a:latin typeface="楷体" panose="02010609060101010101" pitchFamily="49" charset="-122"/>
+                  <a:ea typeface="楷体" panose="02010609060101010101" pitchFamily="49" charset="-122"/>
+                </a:rPr>
+                <a:t>(20+x)min</a:t>
+              </a:r>
+              <a:endParaRPr lang="zh-CN" altLang="en-US" sz="1200" dirty="0">
+                <a:latin typeface="楷体" panose="02010609060101010101" pitchFamily="49" charset="-122"/>
+                <a:ea typeface="楷体" panose="02010609060101010101" pitchFamily="49" charset="-122"/>
+              </a:endParaRPr>
+            </a:p>
+          </p:txBody>
+        </p:sp>
+        <p:sp>
+          <p:nvSpPr>
+            <p:cNvPr id="51" name="文本框 50">
+              <a:extLst>
+                <a:ext uri="{FF2B5EF4-FFF2-40B4-BE49-F238E27FC236}">
+                  <a16:creationId xmlns:a16="http://schemas.microsoft.com/office/drawing/2014/main" id="{C72456FD-5C17-4055-BCB2-B7A230DDCA86}"/>
+                </a:ext>
+              </a:extLst>
+            </p:cNvPr>
+            <p:cNvSpPr txBox="1"/>
+            <p:nvPr/>
+          </p:nvSpPr>
+          <p:spPr>
+            <a:xfrm>
+              <a:off x="3644537" y="2503724"/>
+              <a:ext cx="966652" cy="276999"/>
+            </a:xfrm>
+            <a:prstGeom prst="rect">
+              <a:avLst/>
+            </a:prstGeom>
+            <a:noFill/>
+          </p:spPr>
+          <p:txBody>
+            <a:bodyPr wrap="square" rtlCol="0">
+              <a:spAutoFit/>
+            </a:bodyPr>
+            <a:lstStyle/>
+            <a:p>
+              <a:r>
+                <a:rPr lang="en-US" altLang="zh-CN" sz="1200" dirty="0">
+                  <a:latin typeface="楷体" panose="02010609060101010101" pitchFamily="49" charset="-122"/>
+                  <a:ea typeface="楷体" panose="02010609060101010101" pitchFamily="49" charset="-122"/>
+                </a:rPr>
+                <a:t>(20+x)min</a:t>
+              </a:r>
+              <a:endParaRPr lang="zh-CN" altLang="en-US" sz="1200" dirty="0">
+                <a:latin typeface="楷体" panose="02010609060101010101" pitchFamily="49" charset="-122"/>
+                <a:ea typeface="楷体" panose="02010609060101010101" pitchFamily="49" charset="-122"/>
+              </a:endParaRPr>
+            </a:p>
+          </p:txBody>
+        </p:sp>
+        <p:sp>
+          <p:nvSpPr>
+            <p:cNvPr id="52" name="文本框 51">
+              <a:extLst>
+                <a:ext uri="{FF2B5EF4-FFF2-40B4-BE49-F238E27FC236}">
+                  <a16:creationId xmlns:a16="http://schemas.microsoft.com/office/drawing/2014/main" id="{50252B6D-1D17-4F68-9684-991280F6EF00}"/>
+                </a:ext>
+              </a:extLst>
+            </p:cNvPr>
+            <p:cNvSpPr txBox="1"/>
+            <p:nvPr/>
+          </p:nvSpPr>
+          <p:spPr>
+            <a:xfrm>
+              <a:off x="5365567" y="2961761"/>
+              <a:ext cx="966652" cy="276999"/>
+            </a:xfrm>
+            <a:prstGeom prst="rect">
+              <a:avLst/>
+            </a:prstGeom>
+            <a:noFill/>
+          </p:spPr>
+          <p:txBody>
+            <a:bodyPr wrap="square" rtlCol="0">
+              <a:spAutoFit/>
+            </a:bodyPr>
+            <a:lstStyle/>
+            <a:p>
+              <a:r>
+                <a:rPr lang="en-US" altLang="zh-CN" sz="1200" dirty="0">
+                  <a:latin typeface="楷体" panose="02010609060101010101" pitchFamily="49" charset="-122"/>
+                  <a:ea typeface="楷体" panose="02010609060101010101" pitchFamily="49" charset="-122"/>
+                </a:rPr>
+                <a:t>(20+x)min</a:t>
+              </a:r>
+              <a:endParaRPr lang="zh-CN" altLang="en-US" sz="1200" dirty="0">
+                <a:latin typeface="楷体" panose="02010609060101010101" pitchFamily="49" charset="-122"/>
+                <a:ea typeface="楷体" panose="02010609060101010101" pitchFamily="49" charset="-122"/>
+              </a:endParaRPr>
+            </a:p>
+          </p:txBody>
+        </p:sp>
+        <p:sp>
+          <p:nvSpPr>
+            <p:cNvPr id="53" name="文本框 52">
+              <a:extLst>
+                <a:ext uri="{FF2B5EF4-FFF2-40B4-BE49-F238E27FC236}">
+                  <a16:creationId xmlns:a16="http://schemas.microsoft.com/office/drawing/2014/main" id="{9530C306-9FF6-4603-AD47-6B3EB405EB5F}"/>
+                </a:ext>
+              </a:extLst>
+            </p:cNvPr>
+            <p:cNvSpPr txBox="1"/>
+            <p:nvPr/>
+          </p:nvSpPr>
+          <p:spPr>
+            <a:xfrm>
+              <a:off x="6523266" y="2541820"/>
+              <a:ext cx="1196336" cy="646331"/>
+            </a:xfrm>
+            <a:prstGeom prst="rect">
+              <a:avLst/>
+            </a:prstGeom>
+            <a:noFill/>
+          </p:spPr>
+          <p:txBody>
+            <a:bodyPr wrap="square" rtlCol="0">
+              <a:spAutoFit/>
+            </a:bodyPr>
+            <a:lstStyle/>
+            <a:p>
+              <a:r>
+                <a:rPr lang="zh-CN" altLang="en-US" sz="1200" dirty="0">
+                  <a:latin typeface="楷体" panose="02010609060101010101" pitchFamily="49" charset="-122"/>
+                  <a:ea typeface="楷体" panose="02010609060101010101" pitchFamily="49" charset="-122"/>
+                </a:rPr>
+                <a:t>出行需求量</a:t>
+              </a:r>
+              <a:endParaRPr lang="en-US" altLang="zh-CN" sz="1200" dirty="0">
+                <a:latin typeface="楷体" panose="02010609060101010101" pitchFamily="49" charset="-122"/>
+                <a:ea typeface="楷体" panose="02010609060101010101" pitchFamily="49" charset="-122"/>
+              </a:endParaRPr>
+            </a:p>
+            <a:p>
+              <a:r>
+                <a:rPr lang="en-US" altLang="zh-CN" sz="1200" dirty="0">
+                  <a:latin typeface="楷体" panose="02010609060101010101" pitchFamily="49" charset="-122"/>
+                  <a:ea typeface="楷体" panose="02010609060101010101" pitchFamily="49" charset="-122"/>
+                </a:rPr>
+                <a:t>B-C</a:t>
+              </a:r>
+              <a:r>
+                <a:rPr lang="zh-CN" altLang="en-US" sz="1200" dirty="0">
+                  <a:latin typeface="楷体" panose="02010609060101010101" pitchFamily="49" charset="-122"/>
+                  <a:ea typeface="楷体" panose="02010609060101010101" pitchFamily="49" charset="-122"/>
+                </a:rPr>
+                <a:t>：</a:t>
+              </a:r>
+              <a:r>
+                <a:rPr lang="en-US" altLang="zh-CN" sz="1200" dirty="0">
+                  <a:latin typeface="楷体" panose="02010609060101010101" pitchFamily="49" charset="-122"/>
+                  <a:ea typeface="楷体" panose="02010609060101010101" pitchFamily="49" charset="-122"/>
+                </a:rPr>
+                <a:t>20</a:t>
+              </a:r>
+            </a:p>
+            <a:p>
+              <a:r>
+                <a:rPr lang="en-US" altLang="zh-CN" sz="1200" dirty="0">
+                  <a:latin typeface="楷体" panose="02010609060101010101" pitchFamily="49" charset="-122"/>
+                  <a:ea typeface="楷体" panose="02010609060101010101" pitchFamily="49" charset="-122"/>
+                </a:rPr>
+                <a:t>A-D</a:t>
+              </a:r>
+              <a:r>
+                <a:rPr lang="zh-CN" altLang="en-US" sz="1200" dirty="0">
+                  <a:latin typeface="楷体" panose="02010609060101010101" pitchFamily="49" charset="-122"/>
+                  <a:ea typeface="楷体" panose="02010609060101010101" pitchFamily="49" charset="-122"/>
+                </a:rPr>
+                <a:t>：</a:t>
+              </a:r>
+              <a:r>
+                <a:rPr lang="en-US" altLang="zh-CN" sz="1200" dirty="0">
+                  <a:latin typeface="楷体" panose="02010609060101010101" pitchFamily="49" charset="-122"/>
+                  <a:ea typeface="楷体" panose="02010609060101010101" pitchFamily="49" charset="-122"/>
+                </a:rPr>
+                <a:t>10</a:t>
+              </a:r>
+              <a:endParaRPr lang="zh-CN" altLang="en-US" sz="1200" dirty="0">
+                <a:latin typeface="楷体" panose="02010609060101010101" pitchFamily="49" charset="-122"/>
+                <a:ea typeface="楷体" panose="02010609060101010101" pitchFamily="49" charset="-122"/>
+              </a:endParaRPr>
+            </a:p>
+          </p:txBody>
+        </p:sp>
+        <p:sp>
+          <p:nvSpPr>
+            <p:cNvPr id="54" name="文本框 53">
+              <a:extLst>
+                <a:ext uri="{FF2B5EF4-FFF2-40B4-BE49-F238E27FC236}">
+                  <a16:creationId xmlns:a16="http://schemas.microsoft.com/office/drawing/2014/main" id="{D0E03109-0000-4F2A-B8E7-415C27CF89A6}"/>
+                </a:ext>
+              </a:extLst>
+            </p:cNvPr>
+            <p:cNvSpPr txBox="1"/>
+            <p:nvPr/>
+          </p:nvSpPr>
+          <p:spPr>
+            <a:xfrm>
+              <a:off x="6523266" y="3253776"/>
+              <a:ext cx="1273628" cy="646331"/>
+            </a:xfrm>
+            <a:prstGeom prst="rect">
+              <a:avLst/>
+            </a:prstGeom>
+            <a:noFill/>
+          </p:spPr>
+          <p:txBody>
+            <a:bodyPr wrap="square" rtlCol="0">
+              <a:spAutoFit/>
+            </a:bodyPr>
+            <a:lstStyle/>
+            <a:p>
+              <a:r>
+                <a:rPr lang="zh-CN" altLang="en-US" sz="1200" dirty="0">
+                  <a:latin typeface="楷体" panose="02010609060101010101" pitchFamily="49" charset="-122"/>
+                  <a:ea typeface="楷体" panose="02010609060101010101" pitchFamily="49" charset="-122"/>
+                </a:rPr>
+                <a:t>路径</a:t>
+              </a:r>
+              <a:r>
+                <a:rPr lang="en-US" altLang="zh-CN" sz="1200" dirty="0">
+                  <a:latin typeface="楷体" panose="02010609060101010101" pitchFamily="49" charset="-122"/>
+                  <a:ea typeface="楷体" panose="02010609060101010101" pitchFamily="49" charset="-122"/>
+                </a:rPr>
+                <a:t>1</a:t>
+              </a:r>
+              <a:r>
+                <a:rPr lang="zh-CN" altLang="en-US" sz="1200" dirty="0">
+                  <a:latin typeface="楷体" panose="02010609060101010101" pitchFamily="49" charset="-122"/>
+                  <a:ea typeface="楷体" panose="02010609060101010101" pitchFamily="49" charset="-122"/>
+                </a:rPr>
+                <a:t>：</a:t>
+              </a:r>
+              <a:r>
+                <a:rPr lang="en-US" altLang="zh-CN" sz="1200" dirty="0">
+                  <a:latin typeface="楷体" panose="02010609060101010101" pitchFamily="49" charset="-122"/>
+                  <a:ea typeface="楷体" panose="02010609060101010101" pitchFamily="49" charset="-122"/>
+                </a:rPr>
+                <a:t>A-B-C-D</a:t>
+              </a:r>
+            </a:p>
+            <a:p>
+              <a:r>
+                <a:rPr lang="zh-CN" altLang="en-US" sz="1200" dirty="0">
+                  <a:latin typeface="楷体" panose="02010609060101010101" pitchFamily="49" charset="-122"/>
+                  <a:ea typeface="楷体" panose="02010609060101010101" pitchFamily="49" charset="-122"/>
+                </a:rPr>
+                <a:t>路径</a:t>
+              </a:r>
+              <a:r>
+                <a:rPr lang="en-US" altLang="zh-CN" sz="1200" dirty="0">
+                  <a:latin typeface="楷体" panose="02010609060101010101" pitchFamily="49" charset="-122"/>
+                  <a:ea typeface="楷体" panose="02010609060101010101" pitchFamily="49" charset="-122"/>
+                </a:rPr>
+                <a:t>2</a:t>
+              </a:r>
+              <a:r>
+                <a:rPr lang="zh-CN" altLang="en-US" sz="1200" dirty="0">
+                  <a:latin typeface="楷体" panose="02010609060101010101" pitchFamily="49" charset="-122"/>
+                  <a:ea typeface="楷体" panose="02010609060101010101" pitchFamily="49" charset="-122"/>
+                </a:rPr>
+                <a:t>：</a:t>
+              </a:r>
+              <a:r>
+                <a:rPr lang="en-US" altLang="zh-CN" sz="1200" dirty="0">
+                  <a:latin typeface="楷体" panose="02010609060101010101" pitchFamily="49" charset="-122"/>
+                  <a:ea typeface="楷体" panose="02010609060101010101" pitchFamily="49" charset="-122"/>
+                </a:rPr>
+                <a:t>A-D</a:t>
+              </a:r>
+            </a:p>
+            <a:p>
+              <a:r>
+                <a:rPr lang="zh-CN" altLang="en-US" sz="1200" dirty="0">
+                  <a:latin typeface="楷体" panose="02010609060101010101" pitchFamily="49" charset="-122"/>
+                  <a:ea typeface="楷体" panose="02010609060101010101" pitchFamily="49" charset="-122"/>
+                </a:rPr>
+                <a:t>路径</a:t>
+              </a:r>
+              <a:r>
+                <a:rPr lang="en-US" altLang="zh-CN" sz="1200" dirty="0">
+                  <a:latin typeface="楷体" panose="02010609060101010101" pitchFamily="49" charset="-122"/>
+                  <a:ea typeface="楷体" panose="02010609060101010101" pitchFamily="49" charset="-122"/>
+                </a:rPr>
+                <a:t>3</a:t>
+              </a:r>
+              <a:r>
+                <a:rPr lang="zh-CN" altLang="en-US" sz="1200" dirty="0">
+                  <a:latin typeface="楷体" panose="02010609060101010101" pitchFamily="49" charset="-122"/>
+                  <a:ea typeface="楷体" panose="02010609060101010101" pitchFamily="49" charset="-122"/>
+                </a:rPr>
+                <a:t>：</a:t>
+              </a:r>
+              <a:r>
+                <a:rPr lang="en-US" altLang="zh-CN" sz="1200" dirty="0">
+                  <a:latin typeface="楷体" panose="02010609060101010101" pitchFamily="49" charset="-122"/>
+                  <a:ea typeface="楷体" panose="02010609060101010101" pitchFamily="49" charset="-122"/>
+                </a:rPr>
+                <a:t>B-C</a:t>
+              </a:r>
+              <a:endParaRPr lang="zh-CN" altLang="en-US" sz="1200" dirty="0">
+                <a:latin typeface="楷体" panose="02010609060101010101" pitchFamily="49" charset="-122"/>
+                <a:ea typeface="楷体" panose="02010609060101010101" pitchFamily="49" charset="-122"/>
+              </a:endParaRPr>
+            </a:p>
+          </p:txBody>
+        </p:sp>
+        <p:cxnSp>
+          <p:nvCxnSpPr>
+            <p:cNvPr id="55" name="直接箭头连接符 54">
+              <a:extLst>
+                <a:ext uri="{FF2B5EF4-FFF2-40B4-BE49-F238E27FC236}">
+                  <a16:creationId xmlns:a16="http://schemas.microsoft.com/office/drawing/2014/main" id="{A8F80FB5-4894-4DF5-8411-55C79E50DF5F}"/>
+                </a:ext>
+              </a:extLst>
+            </p:cNvPr>
+            <p:cNvCxnSpPr>
+              <a:cxnSpLocks/>
+              <a:stCxn id="41" idx="6"/>
+              <a:endCxn id="42" idx="2"/>
+            </p:cNvCxnSpPr>
+            <p:nvPr/>
+          </p:nvCxnSpPr>
+          <p:spPr>
+            <a:xfrm>
+              <a:off x="2243546" y="3762947"/>
+              <a:ext cx="3693525" cy="0"/>
+            </a:xfrm>
+            <a:prstGeom prst="straightConnector1">
+              <a:avLst/>
+            </a:prstGeom>
+            <a:ln w="19050">
+              <a:solidFill>
+                <a:srgbClr val="FF0000"/>
+              </a:solidFill>
+              <a:tailEnd type="triangle"/>
+            </a:ln>
+          </p:spPr>
+          <p:style>
+            <a:lnRef idx="1">
+              <a:schemeClr val="accent1"/>
+            </a:lnRef>
+            <a:fillRef idx="0">
+              <a:schemeClr val="accent1"/>
+            </a:fillRef>
+            <a:effectRef idx="0">
+              <a:schemeClr val="accent1"/>
+            </a:effectRef>
+            <a:fontRef idx="minor">
+              <a:schemeClr val="tx1"/>
+            </a:fontRef>
+          </p:style>
+        </p:cxnSp>
+      </p:grpSp>
     </p:spTree>
     <p:extLst>
       <p:ext uri="{BB962C8B-B14F-4D97-AF65-F5344CB8AC3E}">

</xml_diff>